<commit_message>
Fix errors, improve consistency
</commit_message>
<xml_diff>
--- a/Presentation/Resources for v07.pptx
+++ b/Presentation/Resources for v07.pptx
@@ -11,6 +11,7 @@
     <p:sldId id="261" r:id="rId5"/>
     <p:sldId id="259" r:id="rId6"/>
     <p:sldId id="262" r:id="rId7"/>
+    <p:sldId id="263" r:id="rId8"/>
   </p:sldIdLst>
   <p:sldSz cx="21599525" cy="14400213"/>
   <p:notesSz cx="6858000" cy="9144000"/>
@@ -248,7 +249,7 @@
           <a:p>
             <a:fld id="{81E7E37C-ED5B-4A59-BE68-1C8DCE88FF72}" type="datetimeFigureOut">
               <a:rPr lang="de-DE" smtClean="0"/>
-              <a:t>27.06.2019</a:t>
+              <a:t>30.09.2019</a:t>
             </a:fld>
             <a:endParaRPr lang="de-DE"/>
           </a:p>
@@ -418,7 +419,7 @@
           <a:p>
             <a:fld id="{81E7E37C-ED5B-4A59-BE68-1C8DCE88FF72}" type="datetimeFigureOut">
               <a:rPr lang="de-DE" smtClean="0"/>
-              <a:t>27.06.2019</a:t>
+              <a:t>30.09.2019</a:t>
             </a:fld>
             <a:endParaRPr lang="de-DE"/>
           </a:p>
@@ -598,7 +599,7 @@
           <a:p>
             <a:fld id="{81E7E37C-ED5B-4A59-BE68-1C8DCE88FF72}" type="datetimeFigureOut">
               <a:rPr lang="de-DE" smtClean="0"/>
-              <a:t>27.06.2019</a:t>
+              <a:t>30.09.2019</a:t>
             </a:fld>
             <a:endParaRPr lang="de-DE"/>
           </a:p>
@@ -768,7 +769,7 @@
           <a:p>
             <a:fld id="{81E7E37C-ED5B-4A59-BE68-1C8DCE88FF72}" type="datetimeFigureOut">
               <a:rPr lang="de-DE" smtClean="0"/>
-              <a:t>27.06.2019</a:t>
+              <a:t>30.09.2019</a:t>
             </a:fld>
             <a:endParaRPr lang="de-DE"/>
           </a:p>
@@ -1012,7 +1013,7 @@
           <a:p>
             <a:fld id="{81E7E37C-ED5B-4A59-BE68-1C8DCE88FF72}" type="datetimeFigureOut">
               <a:rPr lang="de-DE" smtClean="0"/>
-              <a:t>27.06.2019</a:t>
+              <a:t>30.09.2019</a:t>
             </a:fld>
             <a:endParaRPr lang="de-DE"/>
           </a:p>
@@ -1244,7 +1245,7 @@
           <a:p>
             <a:fld id="{81E7E37C-ED5B-4A59-BE68-1C8DCE88FF72}" type="datetimeFigureOut">
               <a:rPr lang="de-DE" smtClean="0"/>
-              <a:t>27.06.2019</a:t>
+              <a:t>30.09.2019</a:t>
             </a:fld>
             <a:endParaRPr lang="de-DE"/>
           </a:p>
@@ -1611,7 +1612,7 @@
           <a:p>
             <a:fld id="{81E7E37C-ED5B-4A59-BE68-1C8DCE88FF72}" type="datetimeFigureOut">
               <a:rPr lang="de-DE" smtClean="0"/>
-              <a:t>27.06.2019</a:t>
+              <a:t>30.09.2019</a:t>
             </a:fld>
             <a:endParaRPr lang="de-DE"/>
           </a:p>
@@ -1729,7 +1730,7 @@
           <a:p>
             <a:fld id="{81E7E37C-ED5B-4A59-BE68-1C8DCE88FF72}" type="datetimeFigureOut">
               <a:rPr lang="de-DE" smtClean="0"/>
-              <a:t>27.06.2019</a:t>
+              <a:t>30.09.2019</a:t>
             </a:fld>
             <a:endParaRPr lang="de-DE"/>
           </a:p>
@@ -1824,7 +1825,7 @@
           <a:p>
             <a:fld id="{81E7E37C-ED5B-4A59-BE68-1C8DCE88FF72}" type="datetimeFigureOut">
               <a:rPr lang="de-DE" smtClean="0"/>
-              <a:t>27.06.2019</a:t>
+              <a:t>30.09.2019</a:t>
             </a:fld>
             <a:endParaRPr lang="de-DE"/>
           </a:p>
@@ -2101,7 +2102,7 @@
           <a:p>
             <a:fld id="{81E7E37C-ED5B-4A59-BE68-1C8DCE88FF72}" type="datetimeFigureOut">
               <a:rPr lang="de-DE" smtClean="0"/>
-              <a:t>27.06.2019</a:t>
+              <a:t>30.09.2019</a:t>
             </a:fld>
             <a:endParaRPr lang="de-DE"/>
           </a:p>
@@ -2358,7 +2359,7 @@
           <a:p>
             <a:fld id="{81E7E37C-ED5B-4A59-BE68-1C8DCE88FF72}" type="datetimeFigureOut">
               <a:rPr lang="de-DE" smtClean="0"/>
-              <a:t>27.06.2019</a:t>
+              <a:t>30.09.2019</a:t>
             </a:fld>
             <a:endParaRPr lang="de-DE"/>
           </a:p>
@@ -2571,7 +2572,7 @@
           <a:p>
             <a:fld id="{81E7E37C-ED5B-4A59-BE68-1C8DCE88FF72}" type="datetimeFigureOut">
               <a:rPr lang="de-DE" smtClean="0"/>
-              <a:t>27.06.2019</a:t>
+              <a:t>30.09.2019</a:t>
             </a:fld>
             <a:endParaRPr lang="de-DE"/>
           </a:p>
@@ -36008,7 +36009,7 @@
             </a:r>
             <a:r>
               <a:rPr lang="en-GB" dirty="0"/>
-              <a:t>=“add”</a:t>
+              <a:t>=“mix”</a:t>
             </a:r>
           </a:p>
           <a:p>
@@ -36170,7 +36171,7 @@
             </a:r>
             <a:r>
               <a:rPr lang="en-GB" dirty="0"/>
-              <a:t>=“add”</a:t>
+              <a:t>=“mix”</a:t>
             </a:r>
           </a:p>
           <a:p>
@@ -52409,6 +52410,1821 @@
 </p:sld>
 </file>
 
+<file path=ppt/slides/slide7.xml><?xml version="1.0" encoding="utf-8"?>
+<p:sld xmlns:a="http://schemas.openxmlformats.org/drawingml/2006/main" xmlns:r="http://schemas.openxmlformats.org/officeDocument/2006/relationships" xmlns:p="http://schemas.openxmlformats.org/presentationml/2006/main">
+  <p:cSld>
+    <p:spTree>
+      <p:nvGrpSpPr>
+        <p:cNvPr id="1" name=""/>
+        <p:cNvGrpSpPr/>
+        <p:nvPr/>
+      </p:nvGrpSpPr>
+      <p:grpSpPr>
+        <a:xfrm>
+          <a:off x="0" y="0"/>
+          <a:ext cx="0" cy="0"/>
+          <a:chOff x="0" y="0"/>
+          <a:chExt cx="0" cy="0"/>
+        </a:xfrm>
+      </p:grpSpPr>
+      <p:pic>
+        <p:nvPicPr>
+          <p:cNvPr id="5" name="Picture 4">
+            <a:extLst>
+              <a:ext uri="{FF2B5EF4-FFF2-40B4-BE49-F238E27FC236}">
+                <a16:creationId xmlns:a16="http://schemas.microsoft.com/office/drawing/2014/main" id="{AE993A86-E480-43BA-8A01-EF1CB3665DB2}"/>
+              </a:ext>
+            </a:extLst>
+          </p:cNvPr>
+          <p:cNvPicPr>
+            <a:picLocks noChangeAspect="1"/>
+          </p:cNvPicPr>
+          <p:nvPr/>
+        </p:nvPicPr>
+        <p:blipFill>
+          <a:blip r:embed="rId2"/>
+          <a:stretch>
+            <a:fillRect/>
+          </a:stretch>
+        </p:blipFill>
+        <p:spPr>
+          <a:xfrm>
+            <a:off x="4600540" y="5891737"/>
+            <a:ext cx="1390476" cy="1285714"/>
+          </a:xfrm>
+          <a:prstGeom prst="rect">
+            <a:avLst/>
+          </a:prstGeom>
+        </p:spPr>
+      </p:pic>
+      <p:pic>
+        <p:nvPicPr>
+          <p:cNvPr id="6" name="Picture 5">
+            <a:extLst>
+              <a:ext uri="{FF2B5EF4-FFF2-40B4-BE49-F238E27FC236}">
+                <a16:creationId xmlns:a16="http://schemas.microsoft.com/office/drawing/2014/main" id="{1DD733EE-DA29-4F14-BA1E-D0D469142832}"/>
+              </a:ext>
+            </a:extLst>
+          </p:cNvPr>
+          <p:cNvPicPr>
+            <a:picLocks noChangeAspect="1"/>
+          </p:cNvPicPr>
+          <p:nvPr/>
+        </p:nvPicPr>
+        <p:blipFill>
+          <a:blip r:embed="rId3"/>
+          <a:stretch>
+            <a:fillRect/>
+          </a:stretch>
+        </p:blipFill>
+        <p:spPr>
+          <a:xfrm>
+            <a:off x="4214825" y="7313940"/>
+            <a:ext cx="2161905" cy="2028571"/>
+          </a:xfrm>
+          <a:prstGeom prst="rect">
+            <a:avLst/>
+          </a:prstGeom>
+        </p:spPr>
+      </p:pic>
+      <p:pic>
+        <p:nvPicPr>
+          <p:cNvPr id="7" name="Picture 6">
+            <a:extLst>
+              <a:ext uri="{FF2B5EF4-FFF2-40B4-BE49-F238E27FC236}">
+                <a16:creationId xmlns:a16="http://schemas.microsoft.com/office/drawing/2014/main" id="{86DE79AC-4DB5-449D-A29F-E0AE684A238B}"/>
+              </a:ext>
+            </a:extLst>
+          </p:cNvPr>
+          <p:cNvPicPr>
+            <a:picLocks noChangeAspect="1"/>
+          </p:cNvPicPr>
+          <p:nvPr/>
+        </p:nvPicPr>
+        <p:blipFill>
+          <a:blip r:embed="rId4"/>
+          <a:stretch>
+            <a:fillRect/>
+          </a:stretch>
+        </p:blipFill>
+        <p:spPr>
+          <a:xfrm>
+            <a:off x="6835077" y="5853641"/>
+            <a:ext cx="1428571" cy="1323810"/>
+          </a:xfrm>
+          <a:prstGeom prst="rect">
+            <a:avLst/>
+          </a:prstGeom>
+        </p:spPr>
+      </p:pic>
+      <p:pic>
+        <p:nvPicPr>
+          <p:cNvPr id="8" name="Picture 7">
+            <a:extLst>
+              <a:ext uri="{FF2B5EF4-FFF2-40B4-BE49-F238E27FC236}">
+                <a16:creationId xmlns:a16="http://schemas.microsoft.com/office/drawing/2014/main" id="{43824318-CF69-49D6-B72A-E799858FE4AF}"/>
+              </a:ext>
+            </a:extLst>
+          </p:cNvPr>
+          <p:cNvPicPr>
+            <a:picLocks noChangeAspect="1"/>
+          </p:cNvPicPr>
+          <p:nvPr/>
+        </p:nvPicPr>
+        <p:blipFill>
+          <a:blip r:embed="rId5"/>
+          <a:stretch>
+            <a:fillRect/>
+          </a:stretch>
+        </p:blipFill>
+        <p:spPr>
+          <a:xfrm>
+            <a:off x="6473171" y="7313940"/>
+            <a:ext cx="2152381" cy="2057143"/>
+          </a:xfrm>
+          <a:prstGeom prst="rect">
+            <a:avLst/>
+          </a:prstGeom>
+        </p:spPr>
+      </p:pic>
+      <p:pic>
+        <p:nvPicPr>
+          <p:cNvPr id="9" name="Picture 8">
+            <a:extLst>
+              <a:ext uri="{FF2B5EF4-FFF2-40B4-BE49-F238E27FC236}">
+                <a16:creationId xmlns:a16="http://schemas.microsoft.com/office/drawing/2014/main" id="{0FF4794C-2D5E-4EEA-A5C9-C1C1E3CD3900}"/>
+              </a:ext>
+            </a:extLst>
+          </p:cNvPr>
+          <p:cNvPicPr>
+            <a:picLocks noChangeAspect="1"/>
+          </p:cNvPicPr>
+          <p:nvPr/>
+        </p:nvPicPr>
+        <p:blipFill>
+          <a:blip r:embed="rId6"/>
+          <a:stretch>
+            <a:fillRect/>
+          </a:stretch>
+        </p:blipFill>
+        <p:spPr>
+          <a:xfrm>
+            <a:off x="9278047" y="5891737"/>
+            <a:ext cx="1390476" cy="1304762"/>
+          </a:xfrm>
+          <a:prstGeom prst="rect">
+            <a:avLst/>
+          </a:prstGeom>
+        </p:spPr>
+      </p:pic>
+      <p:pic>
+        <p:nvPicPr>
+          <p:cNvPr id="10" name="Picture 9">
+            <a:extLst>
+              <a:ext uri="{FF2B5EF4-FFF2-40B4-BE49-F238E27FC236}">
+                <a16:creationId xmlns:a16="http://schemas.microsoft.com/office/drawing/2014/main" id="{3ABC9AC1-50FA-4467-8214-F3BA784E635F}"/>
+              </a:ext>
+            </a:extLst>
+          </p:cNvPr>
+          <p:cNvPicPr>
+            <a:picLocks noChangeAspect="1"/>
+          </p:cNvPicPr>
+          <p:nvPr/>
+        </p:nvPicPr>
+        <p:blipFill>
+          <a:blip r:embed="rId7"/>
+          <a:stretch>
+            <a:fillRect/>
+          </a:stretch>
+        </p:blipFill>
+        <p:spPr>
+          <a:xfrm>
+            <a:off x="8892332" y="7360033"/>
+            <a:ext cx="2161905" cy="2019048"/>
+          </a:xfrm>
+          <a:prstGeom prst="rect">
+            <a:avLst/>
+          </a:prstGeom>
+        </p:spPr>
+      </p:pic>
+      <p:pic>
+        <p:nvPicPr>
+          <p:cNvPr id="11" name="Picture 10">
+            <a:extLst>
+              <a:ext uri="{FF2B5EF4-FFF2-40B4-BE49-F238E27FC236}">
+                <a16:creationId xmlns:a16="http://schemas.microsoft.com/office/drawing/2014/main" id="{44563D8B-1C66-4BD0-8625-5C2566706384}"/>
+              </a:ext>
+            </a:extLst>
+          </p:cNvPr>
+          <p:cNvPicPr>
+            <a:picLocks noChangeAspect="1"/>
+          </p:cNvPicPr>
+          <p:nvPr/>
+        </p:nvPicPr>
+        <p:blipFill>
+          <a:blip r:embed="rId8"/>
+          <a:stretch>
+            <a:fillRect/>
+          </a:stretch>
+        </p:blipFill>
+        <p:spPr>
+          <a:xfrm>
+            <a:off x="11645572" y="5895344"/>
+            <a:ext cx="1314286" cy="1304762"/>
+          </a:xfrm>
+          <a:prstGeom prst="rect">
+            <a:avLst/>
+          </a:prstGeom>
+        </p:spPr>
+      </p:pic>
+      <p:pic>
+        <p:nvPicPr>
+          <p:cNvPr id="12" name="Picture 11">
+            <a:extLst>
+              <a:ext uri="{FF2B5EF4-FFF2-40B4-BE49-F238E27FC236}">
+                <a16:creationId xmlns:a16="http://schemas.microsoft.com/office/drawing/2014/main" id="{9AD686D1-839A-4505-B212-B70EEA3BF42C}"/>
+              </a:ext>
+            </a:extLst>
+          </p:cNvPr>
+          <p:cNvPicPr>
+            <a:picLocks noChangeAspect="1"/>
+          </p:cNvPicPr>
+          <p:nvPr/>
+        </p:nvPicPr>
+        <p:blipFill>
+          <a:blip r:embed="rId9"/>
+          <a:stretch>
+            <a:fillRect/>
+          </a:stretch>
+        </p:blipFill>
+        <p:spPr>
+          <a:xfrm>
+            <a:off x="11244539" y="7313940"/>
+            <a:ext cx="2180952" cy="1961905"/>
+          </a:xfrm>
+          <a:prstGeom prst="rect">
+            <a:avLst/>
+          </a:prstGeom>
+        </p:spPr>
+      </p:pic>
+      <p:pic>
+        <p:nvPicPr>
+          <p:cNvPr id="13" name="Picture 12">
+            <a:extLst>
+              <a:ext uri="{FF2B5EF4-FFF2-40B4-BE49-F238E27FC236}">
+                <a16:creationId xmlns:a16="http://schemas.microsoft.com/office/drawing/2014/main" id="{50628851-DB7D-402E-A457-C24DCC15F0A7}"/>
+              </a:ext>
+            </a:extLst>
+          </p:cNvPr>
+          <p:cNvPicPr>
+            <a:picLocks noChangeAspect="1"/>
+          </p:cNvPicPr>
+          <p:nvPr/>
+        </p:nvPicPr>
+        <p:blipFill>
+          <a:blip r:embed="rId10"/>
+          <a:stretch>
+            <a:fillRect/>
+          </a:stretch>
+        </p:blipFill>
+        <p:spPr>
+          <a:xfrm>
+            <a:off x="14180856" y="5891737"/>
+            <a:ext cx="1361905" cy="1285714"/>
+          </a:xfrm>
+          <a:prstGeom prst="rect">
+            <a:avLst/>
+          </a:prstGeom>
+        </p:spPr>
+      </p:pic>
+      <p:pic>
+        <p:nvPicPr>
+          <p:cNvPr id="14" name="Picture 13">
+            <a:extLst>
+              <a:ext uri="{FF2B5EF4-FFF2-40B4-BE49-F238E27FC236}">
+                <a16:creationId xmlns:a16="http://schemas.microsoft.com/office/drawing/2014/main" id="{BF6B26C4-389E-4369-BBFD-83A61EDE5FBC}"/>
+              </a:ext>
+            </a:extLst>
+          </p:cNvPr>
+          <p:cNvPicPr>
+            <a:picLocks noChangeAspect="1"/>
+          </p:cNvPicPr>
+          <p:nvPr/>
+        </p:nvPicPr>
+        <p:blipFill>
+          <a:blip r:embed="rId11"/>
+          <a:stretch>
+            <a:fillRect/>
+          </a:stretch>
+        </p:blipFill>
+        <p:spPr>
+          <a:xfrm>
+            <a:off x="13847522" y="7275845"/>
+            <a:ext cx="2028571" cy="2000000"/>
+          </a:xfrm>
+          <a:prstGeom prst="rect">
+            <a:avLst/>
+          </a:prstGeom>
+        </p:spPr>
+      </p:pic>
+      <p:graphicFrame>
+        <p:nvGraphicFramePr>
+          <p:cNvPr id="15" name="Table 14">
+            <a:extLst>
+              <a:ext uri="{FF2B5EF4-FFF2-40B4-BE49-F238E27FC236}">
+                <a16:creationId xmlns:a16="http://schemas.microsoft.com/office/drawing/2014/main" id="{A534C5AB-FB7E-4C16-8E19-2AFE7A716BF9}"/>
+              </a:ext>
+            </a:extLst>
+          </p:cNvPr>
+          <p:cNvGraphicFramePr>
+            <a:graphicFrameLocks noGrp="1"/>
+          </p:cNvGraphicFramePr>
+          <p:nvPr>
+            <p:extLst>
+              <p:ext uri="{D42A27DB-BD31-4B8C-83A1-F6EECF244321}">
+                <p14:modId xmlns:p14="http://schemas.microsoft.com/office/powerpoint/2010/main" val="3075413186"/>
+              </p:ext>
+            </p:extLst>
+          </p:nvPr>
+        </p:nvGraphicFramePr>
+        <p:xfrm>
+          <a:off x="1195754" y="9781349"/>
+          <a:ext cx="14973160" cy="2002536"/>
+        </p:xfrm>
+        <a:graphic>
+          <a:graphicData uri="http://schemas.openxmlformats.org/drawingml/2006/table">
+            <a:tbl>
+              <a:tblPr firstRow="1" bandRow="1">
+                <a:tableStyleId>{2D5ABB26-0587-4C30-8999-92F81FD0307C}</a:tableStyleId>
+              </a:tblPr>
+              <a:tblGrid>
+                <a:gridCol w="3216589">
+                  <a:extLst>
+                    <a:ext uri="{9D8B030D-6E8A-4147-A177-3AD203B41FA5}">
+                      <a16:colId xmlns:a16="http://schemas.microsoft.com/office/drawing/2014/main" val="1600759944"/>
+                    </a:ext>
+                  </a:extLst>
+                </a:gridCol>
+                <a:gridCol w="2177143">
+                  <a:extLst>
+                    <a:ext uri="{9D8B030D-6E8A-4147-A177-3AD203B41FA5}">
+                      <a16:colId xmlns:a16="http://schemas.microsoft.com/office/drawing/2014/main" val="2510398922"/>
+                    </a:ext>
+                  </a:extLst>
+                </a:gridCol>
+                <a:gridCol w="2235200">
+                  <a:extLst>
+                    <a:ext uri="{9D8B030D-6E8A-4147-A177-3AD203B41FA5}">
+                      <a16:colId xmlns:a16="http://schemas.microsoft.com/office/drawing/2014/main" val="408640940"/>
+                    </a:ext>
+                  </a:extLst>
+                </a:gridCol>
+                <a:gridCol w="2481943">
+                  <a:extLst>
+                    <a:ext uri="{9D8B030D-6E8A-4147-A177-3AD203B41FA5}">
+                      <a16:colId xmlns:a16="http://schemas.microsoft.com/office/drawing/2014/main" val="2211015104"/>
+                    </a:ext>
+                  </a:extLst>
+                </a:gridCol>
+                <a:gridCol w="2293257">
+                  <a:extLst>
+                    <a:ext uri="{9D8B030D-6E8A-4147-A177-3AD203B41FA5}">
+                      <a16:colId xmlns:a16="http://schemas.microsoft.com/office/drawing/2014/main" val="2384631075"/>
+                    </a:ext>
+                  </a:extLst>
+                </a:gridCol>
+                <a:gridCol w="2569028">
+                  <a:extLst>
+                    <a:ext uri="{9D8B030D-6E8A-4147-A177-3AD203B41FA5}">
+                      <a16:colId xmlns:a16="http://schemas.microsoft.com/office/drawing/2014/main" val="157512657"/>
+                    </a:ext>
+                  </a:extLst>
+                </a:gridCol>
+              </a:tblGrid>
+              <a:tr h="370840">
+                <a:tc>
+                  <a:txBody>
+                    <a:bodyPr/>
+                    <a:lstStyle/>
+                    <a:p>
+                      <a:r>
+                        <a:rPr lang="en-GB" dirty="0" err="1"/>
+                        <a:t>blendmethod</a:t>
+                      </a:r>
+                      <a:endParaRPr lang="en-US" b="0" dirty="0"/>
+                    </a:p>
+                  </a:txBody>
+                  <a:tcPr>
+                    <a:lnL w="12700" cap="flat" cmpd="sng" algn="ctr">
+                      <a:solidFill>
+                        <a:schemeClr val="tx1"/>
+                      </a:solidFill>
+                      <a:prstDash val="solid"/>
+                      <a:round/>
+                      <a:headEnd type="none" w="med" len="med"/>
+                      <a:tailEnd type="none" w="med" len="med"/>
+                    </a:lnL>
+                    <a:lnR w="12700" cap="flat" cmpd="sng" algn="ctr">
+                      <a:solidFill>
+                        <a:schemeClr val="tx1"/>
+                      </a:solidFill>
+                      <a:prstDash val="solid"/>
+                      <a:round/>
+                      <a:headEnd type="none" w="med" len="med"/>
+                      <a:tailEnd type="none" w="med" len="med"/>
+                    </a:lnR>
+                    <a:lnT w="12700" cap="flat" cmpd="sng" algn="ctr">
+                      <a:solidFill>
+                        <a:schemeClr val="tx1"/>
+                      </a:solidFill>
+                      <a:prstDash val="solid"/>
+                      <a:round/>
+                      <a:headEnd type="none" w="med" len="med"/>
+                      <a:tailEnd type="none" w="med" len="med"/>
+                    </a:lnT>
+                    <a:lnB w="12700" cap="flat" cmpd="sng" algn="ctr">
+                      <a:solidFill>
+                        <a:schemeClr val="tx1"/>
+                      </a:solidFill>
+                      <a:prstDash val="solid"/>
+                      <a:round/>
+                      <a:headEnd type="none" w="med" len="med"/>
+                      <a:tailEnd type="none" w="med" len="med"/>
+                    </a:lnB>
+                  </a:tcPr>
+                </a:tc>
+                <a:tc>
+                  <a:txBody>
+                    <a:bodyPr/>
+                    <a:lstStyle/>
+                    <a:p>
+                      <a:pPr algn="ctr"/>
+                      <a:r>
+                        <a:rPr lang="en-GB" dirty="0"/>
+                        <a:t>mix</a:t>
+                      </a:r>
+                      <a:endParaRPr lang="en-US" b="0" dirty="0"/>
+                    </a:p>
+                  </a:txBody>
+                  <a:tcPr>
+                    <a:lnL w="12700" cap="flat" cmpd="sng" algn="ctr">
+                      <a:solidFill>
+                        <a:schemeClr val="tx1"/>
+                      </a:solidFill>
+                      <a:prstDash val="solid"/>
+                      <a:round/>
+                      <a:headEnd type="none" w="med" len="med"/>
+                      <a:tailEnd type="none" w="med" len="med"/>
+                    </a:lnL>
+                    <a:lnR w="12700" cap="flat" cmpd="sng" algn="ctr">
+                      <a:solidFill>
+                        <a:schemeClr val="tx1"/>
+                      </a:solidFill>
+                      <a:prstDash val="solid"/>
+                      <a:round/>
+                      <a:headEnd type="none" w="med" len="med"/>
+                      <a:tailEnd type="none" w="med" len="med"/>
+                    </a:lnR>
+                    <a:lnT w="12700" cap="flat" cmpd="sng" algn="ctr">
+                      <a:solidFill>
+                        <a:schemeClr val="tx1"/>
+                      </a:solidFill>
+                      <a:prstDash val="solid"/>
+                      <a:round/>
+                      <a:headEnd type="none" w="med" len="med"/>
+                      <a:tailEnd type="none" w="med" len="med"/>
+                    </a:lnT>
+                    <a:lnB w="12700" cap="flat" cmpd="sng" algn="ctr">
+                      <a:solidFill>
+                        <a:schemeClr val="tx1"/>
+                      </a:solidFill>
+                      <a:prstDash val="solid"/>
+                      <a:round/>
+                      <a:headEnd type="none" w="med" len="med"/>
+                      <a:tailEnd type="none" w="med" len="med"/>
+                    </a:lnB>
+                  </a:tcPr>
+                </a:tc>
+                <a:tc>
+                  <a:txBody>
+                    <a:bodyPr/>
+                    <a:lstStyle/>
+                    <a:p>
+                      <a:pPr algn="ctr"/>
+                      <a:r>
+                        <a:rPr lang="en-GB" dirty="0"/>
+                        <a:t>mix</a:t>
+                      </a:r>
+                      <a:endParaRPr lang="en-US" b="0" dirty="0"/>
+                    </a:p>
+                  </a:txBody>
+                  <a:tcPr>
+                    <a:lnL w="12700" cap="flat" cmpd="sng" algn="ctr">
+                      <a:solidFill>
+                        <a:schemeClr val="tx1"/>
+                      </a:solidFill>
+                      <a:prstDash val="solid"/>
+                      <a:round/>
+                      <a:headEnd type="none" w="med" len="med"/>
+                      <a:tailEnd type="none" w="med" len="med"/>
+                    </a:lnL>
+                    <a:lnR w="12700" cap="flat" cmpd="sng" algn="ctr">
+                      <a:solidFill>
+                        <a:schemeClr val="tx1"/>
+                      </a:solidFill>
+                      <a:prstDash val="solid"/>
+                      <a:round/>
+                      <a:headEnd type="none" w="med" len="med"/>
+                      <a:tailEnd type="none" w="med" len="med"/>
+                    </a:lnR>
+                    <a:lnT w="12700" cap="flat" cmpd="sng" algn="ctr">
+                      <a:solidFill>
+                        <a:schemeClr val="tx1"/>
+                      </a:solidFill>
+                      <a:prstDash val="solid"/>
+                      <a:round/>
+                      <a:headEnd type="none" w="med" len="med"/>
+                      <a:tailEnd type="none" w="med" len="med"/>
+                    </a:lnT>
+                    <a:lnB w="12700" cap="flat" cmpd="sng" algn="ctr">
+                      <a:solidFill>
+                        <a:schemeClr val="tx1"/>
+                      </a:solidFill>
+                      <a:prstDash val="solid"/>
+                      <a:round/>
+                      <a:headEnd type="none" w="med" len="med"/>
+                      <a:tailEnd type="none" w="med" len="med"/>
+                    </a:lnB>
+                  </a:tcPr>
+                </a:tc>
+                <a:tc>
+                  <a:txBody>
+                    <a:bodyPr/>
+                    <a:lstStyle/>
+                    <a:p>
+                      <a:pPr algn="ctr"/>
+                      <a:r>
+                        <a:rPr lang="en-GB" dirty="0"/>
+                        <a:t>mix</a:t>
+                      </a:r>
+                      <a:endParaRPr lang="en-US" b="0" dirty="0"/>
+                    </a:p>
+                  </a:txBody>
+                  <a:tcPr>
+                    <a:lnL w="12700" cap="flat" cmpd="sng" algn="ctr">
+                      <a:solidFill>
+                        <a:schemeClr val="tx1"/>
+                      </a:solidFill>
+                      <a:prstDash val="solid"/>
+                      <a:round/>
+                      <a:headEnd type="none" w="med" len="med"/>
+                      <a:tailEnd type="none" w="med" len="med"/>
+                    </a:lnL>
+                    <a:lnR w="12700" cap="flat" cmpd="sng" algn="ctr">
+                      <a:solidFill>
+                        <a:schemeClr val="tx1"/>
+                      </a:solidFill>
+                      <a:prstDash val="solid"/>
+                      <a:round/>
+                      <a:headEnd type="none" w="med" len="med"/>
+                      <a:tailEnd type="none" w="med" len="med"/>
+                    </a:lnR>
+                    <a:lnT w="12700" cap="flat" cmpd="sng" algn="ctr">
+                      <a:solidFill>
+                        <a:schemeClr val="tx1"/>
+                      </a:solidFill>
+                      <a:prstDash val="solid"/>
+                      <a:round/>
+                      <a:headEnd type="none" w="med" len="med"/>
+                      <a:tailEnd type="none" w="med" len="med"/>
+                    </a:lnT>
+                    <a:lnB w="12700" cap="flat" cmpd="sng" algn="ctr">
+                      <a:solidFill>
+                        <a:schemeClr val="tx1"/>
+                      </a:solidFill>
+                      <a:prstDash val="solid"/>
+                      <a:round/>
+                      <a:headEnd type="none" w="med" len="med"/>
+                      <a:tailEnd type="none" w="med" len="med"/>
+                    </a:lnB>
+                  </a:tcPr>
+                </a:tc>
+                <a:tc>
+                  <a:txBody>
+                    <a:bodyPr/>
+                    <a:lstStyle/>
+                    <a:p>
+                      <a:pPr algn="ctr"/>
+                      <a:r>
+                        <a:rPr lang="en-GB" dirty="0"/>
+                        <a:t>mix</a:t>
+                      </a:r>
+                      <a:endParaRPr lang="en-US" b="0" dirty="0"/>
+                    </a:p>
+                  </a:txBody>
+                  <a:tcPr>
+                    <a:lnL w="12700" cap="flat" cmpd="sng" algn="ctr">
+                      <a:solidFill>
+                        <a:schemeClr val="tx1"/>
+                      </a:solidFill>
+                      <a:prstDash val="solid"/>
+                      <a:round/>
+                      <a:headEnd type="none" w="med" len="med"/>
+                      <a:tailEnd type="none" w="med" len="med"/>
+                    </a:lnL>
+                    <a:lnR w="12700" cap="flat" cmpd="sng" algn="ctr">
+                      <a:solidFill>
+                        <a:schemeClr val="tx1"/>
+                      </a:solidFill>
+                      <a:prstDash val="solid"/>
+                      <a:round/>
+                      <a:headEnd type="none" w="med" len="med"/>
+                      <a:tailEnd type="none" w="med" len="med"/>
+                    </a:lnR>
+                    <a:lnT w="12700" cap="flat" cmpd="sng" algn="ctr">
+                      <a:solidFill>
+                        <a:schemeClr val="tx1"/>
+                      </a:solidFill>
+                      <a:prstDash val="solid"/>
+                      <a:round/>
+                      <a:headEnd type="none" w="med" len="med"/>
+                      <a:tailEnd type="none" w="med" len="med"/>
+                    </a:lnT>
+                    <a:lnB w="12700" cap="flat" cmpd="sng" algn="ctr">
+                      <a:solidFill>
+                        <a:schemeClr val="tx1"/>
+                      </a:solidFill>
+                      <a:prstDash val="solid"/>
+                      <a:round/>
+                      <a:headEnd type="none" w="med" len="med"/>
+                      <a:tailEnd type="none" w="med" len="med"/>
+                    </a:lnB>
+                  </a:tcPr>
+                </a:tc>
+                <a:tc>
+                  <a:txBody>
+                    <a:bodyPr/>
+                    <a:lstStyle/>
+                    <a:p>
+                      <a:pPr algn="ctr"/>
+                      <a:r>
+                        <a:rPr lang="en-GB" dirty="0"/>
+                        <a:t>multiply</a:t>
+                      </a:r>
+                      <a:endParaRPr lang="en-US" b="0" dirty="0"/>
+                    </a:p>
+                  </a:txBody>
+                  <a:tcPr>
+                    <a:lnL w="12700" cap="flat" cmpd="sng" algn="ctr">
+                      <a:solidFill>
+                        <a:schemeClr val="tx1"/>
+                      </a:solidFill>
+                      <a:prstDash val="solid"/>
+                      <a:round/>
+                      <a:headEnd type="none" w="med" len="med"/>
+                      <a:tailEnd type="none" w="med" len="med"/>
+                    </a:lnL>
+                    <a:lnR w="12700" cap="flat" cmpd="sng" algn="ctr">
+                      <a:solidFill>
+                        <a:schemeClr val="tx1"/>
+                      </a:solidFill>
+                      <a:prstDash val="solid"/>
+                      <a:round/>
+                      <a:headEnd type="none" w="med" len="med"/>
+                      <a:tailEnd type="none" w="med" len="med"/>
+                    </a:lnR>
+                    <a:lnT w="12700" cap="flat" cmpd="sng" algn="ctr">
+                      <a:solidFill>
+                        <a:schemeClr val="tx1"/>
+                      </a:solidFill>
+                      <a:prstDash val="solid"/>
+                      <a:round/>
+                      <a:headEnd type="none" w="med" len="med"/>
+                      <a:tailEnd type="none" w="med" len="med"/>
+                    </a:lnT>
+                    <a:lnB w="12700" cap="flat" cmpd="sng" algn="ctr">
+                      <a:solidFill>
+                        <a:schemeClr val="tx1"/>
+                      </a:solidFill>
+                      <a:prstDash val="solid"/>
+                      <a:round/>
+                      <a:headEnd type="none" w="med" len="med"/>
+                      <a:tailEnd type="none" w="med" len="med"/>
+                    </a:lnB>
+                  </a:tcPr>
+                </a:tc>
+                <a:extLst>
+                  <a:ext uri="{0D108BD9-81ED-4DB2-BD59-A6C34878D82A}">
+                    <a16:rowId xmlns:a16="http://schemas.microsoft.com/office/drawing/2014/main" val="2750086544"/>
+                  </a:ext>
+                </a:extLst>
+              </a:tr>
+              <a:tr h="370840">
+                <a:tc>
+                  <a:txBody>
+                    <a:bodyPr/>
+                    <a:lstStyle/>
+                    <a:p>
+                      <a:pPr marL="0" marR="0" lvl="0" indent="0" algn="l" defTabSz="1920057" rtl="0" eaLnBrk="1" fontAlgn="auto" latinLnBrk="0" hangingPunct="1">
+                        <a:lnSpc>
+                          <a:spcPct val="100000"/>
+                        </a:lnSpc>
+                        <a:spcBef>
+                          <a:spcPts val="0"/>
+                        </a:spcBef>
+                        <a:spcAft>
+                          <a:spcPts val="0"/>
+                        </a:spcAft>
+                        <a:buClrTx/>
+                        <a:buSzTx/>
+                        <a:buFontTx/>
+                        <a:buNone/>
+                        <a:tabLst/>
+                        <a:defRPr/>
+                      </a:pPr>
+                      <a:r>
+                        <a:rPr lang="en-GB" dirty="0" err="1"/>
+                        <a:t>dstalpha</a:t>
+                      </a:r>
+                      <a:endParaRPr lang="en-US" b="0" dirty="0"/>
+                    </a:p>
+                  </a:txBody>
+                  <a:tcPr>
+                    <a:lnL w="12700" cap="flat" cmpd="sng" algn="ctr">
+                      <a:solidFill>
+                        <a:schemeClr val="tx1"/>
+                      </a:solidFill>
+                      <a:prstDash val="solid"/>
+                      <a:round/>
+                      <a:headEnd type="none" w="med" len="med"/>
+                      <a:tailEnd type="none" w="med" len="med"/>
+                    </a:lnL>
+                    <a:lnR w="12700" cap="flat" cmpd="sng" algn="ctr">
+                      <a:solidFill>
+                        <a:schemeClr val="tx1"/>
+                      </a:solidFill>
+                      <a:prstDash val="solid"/>
+                      <a:round/>
+                      <a:headEnd type="none" w="med" len="med"/>
+                      <a:tailEnd type="none" w="med" len="med"/>
+                    </a:lnR>
+                    <a:lnT w="12700" cap="flat" cmpd="sng" algn="ctr">
+                      <a:solidFill>
+                        <a:schemeClr val="tx1"/>
+                      </a:solidFill>
+                      <a:prstDash val="solid"/>
+                      <a:round/>
+                      <a:headEnd type="none" w="med" len="med"/>
+                      <a:tailEnd type="none" w="med" len="med"/>
+                    </a:lnT>
+                    <a:lnB w="12700" cap="flat" cmpd="sng" algn="ctr">
+                      <a:solidFill>
+                        <a:schemeClr val="tx1"/>
+                      </a:solidFill>
+                      <a:prstDash val="solid"/>
+                      <a:round/>
+                      <a:headEnd type="none" w="med" len="med"/>
+                      <a:tailEnd type="none" w="med" len="med"/>
+                    </a:lnB>
+                  </a:tcPr>
+                </a:tc>
+                <a:tc>
+                  <a:txBody>
+                    <a:bodyPr/>
+                    <a:lstStyle/>
+                    <a:p>
+                      <a:pPr algn="ctr"/>
+                      <a:r>
+                        <a:rPr lang="en-GB" dirty="0"/>
+                        <a:t>0</a:t>
+                      </a:r>
+                      <a:endParaRPr lang="en-US" b="0" dirty="0"/>
+                    </a:p>
+                  </a:txBody>
+                  <a:tcPr>
+                    <a:lnL w="12700" cap="flat" cmpd="sng" algn="ctr">
+                      <a:solidFill>
+                        <a:schemeClr val="tx1"/>
+                      </a:solidFill>
+                      <a:prstDash val="solid"/>
+                      <a:round/>
+                      <a:headEnd type="none" w="med" len="med"/>
+                      <a:tailEnd type="none" w="med" len="med"/>
+                    </a:lnL>
+                    <a:lnR w="12700" cap="flat" cmpd="sng" algn="ctr">
+                      <a:solidFill>
+                        <a:schemeClr val="tx1"/>
+                      </a:solidFill>
+                      <a:prstDash val="solid"/>
+                      <a:round/>
+                      <a:headEnd type="none" w="med" len="med"/>
+                      <a:tailEnd type="none" w="med" len="med"/>
+                    </a:lnR>
+                    <a:lnT w="12700" cap="flat" cmpd="sng" algn="ctr">
+                      <a:solidFill>
+                        <a:schemeClr val="tx1"/>
+                      </a:solidFill>
+                      <a:prstDash val="solid"/>
+                      <a:round/>
+                      <a:headEnd type="none" w="med" len="med"/>
+                      <a:tailEnd type="none" w="med" len="med"/>
+                    </a:lnT>
+                    <a:lnB w="12700" cap="flat" cmpd="sng" algn="ctr">
+                      <a:solidFill>
+                        <a:schemeClr val="tx1"/>
+                      </a:solidFill>
+                      <a:prstDash val="solid"/>
+                      <a:round/>
+                      <a:headEnd type="none" w="med" len="med"/>
+                      <a:tailEnd type="none" w="med" len="med"/>
+                    </a:lnB>
+                  </a:tcPr>
+                </a:tc>
+                <a:tc>
+                  <a:txBody>
+                    <a:bodyPr/>
+                    <a:lstStyle/>
+                    <a:p>
+                      <a:pPr algn="ctr"/>
+                      <a:r>
+                        <a:rPr lang="en-GB" dirty="0"/>
+                        <a:t>1</a:t>
+                      </a:r>
+                      <a:endParaRPr lang="en-US" b="0" dirty="0"/>
+                    </a:p>
+                  </a:txBody>
+                  <a:tcPr>
+                    <a:lnL w="12700" cap="flat" cmpd="sng" algn="ctr">
+                      <a:solidFill>
+                        <a:schemeClr val="tx1"/>
+                      </a:solidFill>
+                      <a:prstDash val="solid"/>
+                      <a:round/>
+                      <a:headEnd type="none" w="med" len="med"/>
+                      <a:tailEnd type="none" w="med" len="med"/>
+                    </a:lnL>
+                    <a:lnR w="12700" cap="flat" cmpd="sng" algn="ctr">
+                      <a:solidFill>
+                        <a:schemeClr val="tx1"/>
+                      </a:solidFill>
+                      <a:prstDash val="solid"/>
+                      <a:round/>
+                      <a:headEnd type="none" w="med" len="med"/>
+                      <a:tailEnd type="none" w="med" len="med"/>
+                    </a:lnR>
+                    <a:lnT w="12700" cap="flat" cmpd="sng" algn="ctr">
+                      <a:solidFill>
+                        <a:schemeClr val="tx1"/>
+                      </a:solidFill>
+                      <a:prstDash val="solid"/>
+                      <a:round/>
+                      <a:headEnd type="none" w="med" len="med"/>
+                      <a:tailEnd type="none" w="med" len="med"/>
+                    </a:lnT>
+                    <a:lnB w="12700" cap="flat" cmpd="sng" algn="ctr">
+                      <a:solidFill>
+                        <a:schemeClr val="tx1"/>
+                      </a:solidFill>
+                      <a:prstDash val="solid"/>
+                      <a:round/>
+                      <a:headEnd type="none" w="med" len="med"/>
+                      <a:tailEnd type="none" w="med" len="med"/>
+                    </a:lnB>
+                  </a:tcPr>
+                </a:tc>
+                <a:tc>
+                  <a:txBody>
+                    <a:bodyPr/>
+                    <a:lstStyle/>
+                    <a:p>
+                      <a:pPr algn="ctr"/>
+                      <a:r>
+                        <a:rPr lang="en-GB" dirty="0"/>
+                        <a:t>1</a:t>
+                      </a:r>
+                      <a:endParaRPr lang="en-US" b="0" dirty="0"/>
+                    </a:p>
+                  </a:txBody>
+                  <a:tcPr>
+                    <a:lnL w="12700" cap="flat" cmpd="sng" algn="ctr">
+                      <a:solidFill>
+                        <a:schemeClr val="tx1"/>
+                      </a:solidFill>
+                      <a:prstDash val="solid"/>
+                      <a:round/>
+                      <a:headEnd type="none" w="med" len="med"/>
+                      <a:tailEnd type="none" w="med" len="med"/>
+                    </a:lnL>
+                    <a:lnR w="12700" cap="flat" cmpd="sng" algn="ctr">
+                      <a:solidFill>
+                        <a:schemeClr val="tx1"/>
+                      </a:solidFill>
+                      <a:prstDash val="solid"/>
+                      <a:round/>
+                      <a:headEnd type="none" w="med" len="med"/>
+                      <a:tailEnd type="none" w="med" len="med"/>
+                    </a:lnR>
+                    <a:lnT w="12700" cap="flat" cmpd="sng" algn="ctr">
+                      <a:solidFill>
+                        <a:schemeClr val="tx1"/>
+                      </a:solidFill>
+                      <a:prstDash val="solid"/>
+                      <a:round/>
+                      <a:headEnd type="none" w="med" len="med"/>
+                      <a:tailEnd type="none" w="med" len="med"/>
+                    </a:lnT>
+                    <a:lnB w="12700" cap="flat" cmpd="sng" algn="ctr">
+                      <a:solidFill>
+                        <a:schemeClr val="tx1"/>
+                      </a:solidFill>
+                      <a:prstDash val="solid"/>
+                      <a:round/>
+                      <a:headEnd type="none" w="med" len="med"/>
+                      <a:tailEnd type="none" w="med" len="med"/>
+                    </a:lnB>
+                  </a:tcPr>
+                </a:tc>
+                <a:tc>
+                  <a:txBody>
+                    <a:bodyPr/>
+                    <a:lstStyle/>
+                    <a:p>
+                      <a:pPr algn="ctr"/>
+                      <a:r>
+                        <a:rPr lang="en-GB" dirty="0"/>
+                        <a:t>1</a:t>
+                      </a:r>
+                      <a:endParaRPr lang="en-US" b="0" dirty="0"/>
+                    </a:p>
+                  </a:txBody>
+                  <a:tcPr>
+                    <a:lnL w="12700" cap="flat" cmpd="sng" algn="ctr">
+                      <a:solidFill>
+                        <a:schemeClr val="tx1"/>
+                      </a:solidFill>
+                      <a:prstDash val="solid"/>
+                      <a:round/>
+                      <a:headEnd type="none" w="med" len="med"/>
+                      <a:tailEnd type="none" w="med" len="med"/>
+                    </a:lnL>
+                    <a:lnR w="12700" cap="flat" cmpd="sng" algn="ctr">
+                      <a:solidFill>
+                        <a:schemeClr val="tx1"/>
+                      </a:solidFill>
+                      <a:prstDash val="solid"/>
+                      <a:round/>
+                      <a:headEnd type="none" w="med" len="med"/>
+                      <a:tailEnd type="none" w="med" len="med"/>
+                    </a:lnR>
+                    <a:lnT w="12700" cap="flat" cmpd="sng" algn="ctr">
+                      <a:solidFill>
+                        <a:schemeClr val="tx1"/>
+                      </a:solidFill>
+                      <a:prstDash val="solid"/>
+                      <a:round/>
+                      <a:headEnd type="none" w="med" len="med"/>
+                      <a:tailEnd type="none" w="med" len="med"/>
+                    </a:lnT>
+                    <a:lnB w="12700" cap="flat" cmpd="sng" algn="ctr">
+                      <a:solidFill>
+                        <a:schemeClr val="tx1"/>
+                      </a:solidFill>
+                      <a:prstDash val="solid"/>
+                      <a:round/>
+                      <a:headEnd type="none" w="med" len="med"/>
+                      <a:tailEnd type="none" w="med" len="med"/>
+                    </a:lnB>
+                  </a:tcPr>
+                </a:tc>
+                <a:tc>
+                  <a:txBody>
+                    <a:bodyPr/>
+                    <a:lstStyle/>
+                    <a:p>
+                      <a:pPr algn="ctr"/>
+                      <a:r>
+                        <a:rPr lang="en-GB" dirty="0" err="1"/>
+                        <a:t>n.a.</a:t>
+                      </a:r>
+                      <a:endParaRPr lang="en-US" b="0" dirty="0"/>
+                    </a:p>
+                  </a:txBody>
+                  <a:tcPr>
+                    <a:lnL w="12700" cap="flat" cmpd="sng" algn="ctr">
+                      <a:solidFill>
+                        <a:schemeClr val="tx1"/>
+                      </a:solidFill>
+                      <a:prstDash val="solid"/>
+                      <a:round/>
+                      <a:headEnd type="none" w="med" len="med"/>
+                      <a:tailEnd type="none" w="med" len="med"/>
+                    </a:lnL>
+                    <a:lnR w="12700" cap="flat" cmpd="sng" algn="ctr">
+                      <a:solidFill>
+                        <a:schemeClr val="tx1"/>
+                      </a:solidFill>
+                      <a:prstDash val="solid"/>
+                      <a:round/>
+                      <a:headEnd type="none" w="med" len="med"/>
+                      <a:tailEnd type="none" w="med" len="med"/>
+                    </a:lnR>
+                    <a:lnT w="12700" cap="flat" cmpd="sng" algn="ctr">
+                      <a:solidFill>
+                        <a:schemeClr val="tx1"/>
+                      </a:solidFill>
+                      <a:prstDash val="solid"/>
+                      <a:round/>
+                      <a:headEnd type="none" w="med" len="med"/>
+                      <a:tailEnd type="none" w="med" len="med"/>
+                    </a:lnT>
+                    <a:lnB w="12700" cap="flat" cmpd="sng" algn="ctr">
+                      <a:solidFill>
+                        <a:schemeClr val="tx1"/>
+                      </a:solidFill>
+                      <a:prstDash val="solid"/>
+                      <a:round/>
+                      <a:headEnd type="none" w="med" len="med"/>
+                      <a:tailEnd type="none" w="med" len="med"/>
+                    </a:lnB>
+                  </a:tcPr>
+                </a:tc>
+                <a:extLst>
+                  <a:ext uri="{0D108BD9-81ED-4DB2-BD59-A6C34878D82A}">
+                    <a16:rowId xmlns:a16="http://schemas.microsoft.com/office/drawing/2014/main" val="2693831988"/>
+                  </a:ext>
+                </a:extLst>
+              </a:tr>
+              <a:tr h="370840">
+                <a:tc>
+                  <a:txBody>
+                    <a:bodyPr/>
+                    <a:lstStyle/>
+                    <a:p>
+                      <a:pPr marL="0" marR="0" lvl="0" indent="0" algn="l" defTabSz="1920057" rtl="0" eaLnBrk="1" fontAlgn="auto" latinLnBrk="0" hangingPunct="1">
+                        <a:lnSpc>
+                          <a:spcPct val="100000"/>
+                        </a:lnSpc>
+                        <a:spcBef>
+                          <a:spcPts val="0"/>
+                        </a:spcBef>
+                        <a:spcAft>
+                          <a:spcPts val="0"/>
+                        </a:spcAft>
+                        <a:buClrTx/>
+                        <a:buSzTx/>
+                        <a:buFontTx/>
+                        <a:buNone/>
+                        <a:tabLst/>
+                        <a:defRPr/>
+                      </a:pPr>
+                      <a:r>
+                        <a:rPr lang="en-GB" dirty="0" err="1"/>
+                        <a:t>srcalpha</a:t>
+                      </a:r>
+                      <a:endParaRPr lang="en-US" b="0" dirty="0"/>
+                    </a:p>
+                  </a:txBody>
+                  <a:tcPr>
+                    <a:lnL w="12700" cap="flat" cmpd="sng" algn="ctr">
+                      <a:solidFill>
+                        <a:schemeClr val="tx1"/>
+                      </a:solidFill>
+                      <a:prstDash val="solid"/>
+                      <a:round/>
+                      <a:headEnd type="none" w="med" len="med"/>
+                      <a:tailEnd type="none" w="med" len="med"/>
+                    </a:lnL>
+                    <a:lnR w="12700" cap="flat" cmpd="sng" algn="ctr">
+                      <a:solidFill>
+                        <a:schemeClr val="tx1"/>
+                      </a:solidFill>
+                      <a:prstDash val="solid"/>
+                      <a:round/>
+                      <a:headEnd type="none" w="med" len="med"/>
+                      <a:tailEnd type="none" w="med" len="med"/>
+                    </a:lnR>
+                    <a:lnT w="12700" cap="flat" cmpd="sng" algn="ctr">
+                      <a:solidFill>
+                        <a:schemeClr val="tx1"/>
+                      </a:solidFill>
+                      <a:prstDash val="solid"/>
+                      <a:round/>
+                      <a:headEnd type="none" w="med" len="med"/>
+                      <a:tailEnd type="none" w="med" len="med"/>
+                    </a:lnT>
+                    <a:lnB w="12700" cap="flat" cmpd="sng" algn="ctr">
+                      <a:solidFill>
+                        <a:schemeClr val="tx1"/>
+                      </a:solidFill>
+                      <a:prstDash val="solid"/>
+                      <a:round/>
+                      <a:headEnd type="none" w="med" len="med"/>
+                      <a:tailEnd type="none" w="med" len="med"/>
+                    </a:lnB>
+                  </a:tcPr>
+                </a:tc>
+                <a:tc>
+                  <a:txBody>
+                    <a:bodyPr/>
+                    <a:lstStyle/>
+                    <a:p>
+                      <a:pPr algn="ctr"/>
+                      <a:r>
+                        <a:rPr lang="en-GB" dirty="0"/>
+                        <a:t>1</a:t>
+                      </a:r>
+                      <a:endParaRPr lang="en-US" b="0" dirty="0"/>
+                    </a:p>
+                  </a:txBody>
+                  <a:tcPr>
+                    <a:lnL w="12700" cap="flat" cmpd="sng" algn="ctr">
+                      <a:solidFill>
+                        <a:schemeClr val="tx1"/>
+                      </a:solidFill>
+                      <a:prstDash val="solid"/>
+                      <a:round/>
+                      <a:headEnd type="none" w="med" len="med"/>
+                      <a:tailEnd type="none" w="med" len="med"/>
+                    </a:lnL>
+                    <a:lnR w="12700" cap="flat" cmpd="sng" algn="ctr">
+                      <a:solidFill>
+                        <a:schemeClr val="tx1"/>
+                      </a:solidFill>
+                      <a:prstDash val="solid"/>
+                      <a:round/>
+                      <a:headEnd type="none" w="med" len="med"/>
+                      <a:tailEnd type="none" w="med" len="med"/>
+                    </a:lnR>
+                    <a:lnT w="12700" cap="flat" cmpd="sng" algn="ctr">
+                      <a:solidFill>
+                        <a:schemeClr val="tx1"/>
+                      </a:solidFill>
+                      <a:prstDash val="solid"/>
+                      <a:round/>
+                      <a:headEnd type="none" w="med" len="med"/>
+                      <a:tailEnd type="none" w="med" len="med"/>
+                    </a:lnT>
+                    <a:lnB w="12700" cap="flat" cmpd="sng" algn="ctr">
+                      <a:solidFill>
+                        <a:schemeClr val="tx1"/>
+                      </a:solidFill>
+                      <a:prstDash val="solid"/>
+                      <a:round/>
+                      <a:headEnd type="none" w="med" len="med"/>
+                      <a:tailEnd type="none" w="med" len="med"/>
+                    </a:lnB>
+                  </a:tcPr>
+                </a:tc>
+                <a:tc>
+                  <a:txBody>
+                    <a:bodyPr/>
+                    <a:lstStyle/>
+                    <a:p>
+                      <a:pPr algn="ctr"/>
+                      <a:r>
+                        <a:rPr lang="en-GB" dirty="0"/>
+                        <a:t>0</a:t>
+                      </a:r>
+                      <a:endParaRPr lang="en-US" b="0" dirty="0"/>
+                    </a:p>
+                  </a:txBody>
+                  <a:tcPr>
+                    <a:lnL w="12700" cap="flat" cmpd="sng" algn="ctr">
+                      <a:solidFill>
+                        <a:schemeClr val="tx1"/>
+                      </a:solidFill>
+                      <a:prstDash val="solid"/>
+                      <a:round/>
+                      <a:headEnd type="none" w="med" len="med"/>
+                      <a:tailEnd type="none" w="med" len="med"/>
+                    </a:lnL>
+                    <a:lnR w="12700" cap="flat" cmpd="sng" algn="ctr">
+                      <a:solidFill>
+                        <a:schemeClr val="tx1"/>
+                      </a:solidFill>
+                      <a:prstDash val="solid"/>
+                      <a:round/>
+                      <a:headEnd type="none" w="med" len="med"/>
+                      <a:tailEnd type="none" w="med" len="med"/>
+                    </a:lnR>
+                    <a:lnT w="12700" cap="flat" cmpd="sng" algn="ctr">
+                      <a:solidFill>
+                        <a:schemeClr val="tx1"/>
+                      </a:solidFill>
+                      <a:prstDash val="solid"/>
+                      <a:round/>
+                      <a:headEnd type="none" w="med" len="med"/>
+                      <a:tailEnd type="none" w="med" len="med"/>
+                    </a:lnT>
+                    <a:lnB w="12700" cap="flat" cmpd="sng" algn="ctr">
+                      <a:solidFill>
+                        <a:schemeClr val="tx1"/>
+                      </a:solidFill>
+                      <a:prstDash val="solid"/>
+                      <a:round/>
+                      <a:headEnd type="none" w="med" len="med"/>
+                      <a:tailEnd type="none" w="med" len="med"/>
+                    </a:lnB>
+                  </a:tcPr>
+                </a:tc>
+                <a:tc>
+                  <a:txBody>
+                    <a:bodyPr/>
+                    <a:lstStyle/>
+                    <a:p>
+                      <a:pPr algn="ctr"/>
+                      <a:r>
+                        <a:rPr lang="en-GB" dirty="0"/>
+                        <a:t>1</a:t>
+                      </a:r>
+                      <a:endParaRPr lang="en-US" b="0" dirty="0"/>
+                    </a:p>
+                  </a:txBody>
+                  <a:tcPr>
+                    <a:lnL w="12700" cap="flat" cmpd="sng" algn="ctr">
+                      <a:solidFill>
+                        <a:schemeClr val="tx1"/>
+                      </a:solidFill>
+                      <a:prstDash val="solid"/>
+                      <a:round/>
+                      <a:headEnd type="none" w="med" len="med"/>
+                      <a:tailEnd type="none" w="med" len="med"/>
+                    </a:lnL>
+                    <a:lnR w="12700" cap="flat" cmpd="sng" algn="ctr">
+                      <a:solidFill>
+                        <a:schemeClr val="tx1"/>
+                      </a:solidFill>
+                      <a:prstDash val="solid"/>
+                      <a:round/>
+                      <a:headEnd type="none" w="med" len="med"/>
+                      <a:tailEnd type="none" w="med" len="med"/>
+                    </a:lnR>
+                    <a:lnT w="12700" cap="flat" cmpd="sng" algn="ctr">
+                      <a:solidFill>
+                        <a:schemeClr val="tx1"/>
+                      </a:solidFill>
+                      <a:prstDash val="solid"/>
+                      <a:round/>
+                      <a:headEnd type="none" w="med" len="med"/>
+                      <a:tailEnd type="none" w="med" len="med"/>
+                    </a:lnT>
+                    <a:lnB w="12700" cap="flat" cmpd="sng" algn="ctr">
+                      <a:solidFill>
+                        <a:schemeClr val="tx1"/>
+                      </a:solidFill>
+                      <a:prstDash val="solid"/>
+                      <a:round/>
+                      <a:headEnd type="none" w="med" len="med"/>
+                      <a:tailEnd type="none" w="med" len="med"/>
+                    </a:lnB>
+                  </a:tcPr>
+                </a:tc>
+                <a:tc>
+                  <a:txBody>
+                    <a:bodyPr/>
+                    <a:lstStyle/>
+                    <a:p>
+                      <a:pPr algn="ctr"/>
+                      <a:r>
+                        <a:rPr lang="en-GB" dirty="0"/>
+                        <a:t>-1</a:t>
+                      </a:r>
+                      <a:endParaRPr lang="en-US" b="0" dirty="0"/>
+                    </a:p>
+                  </a:txBody>
+                  <a:tcPr>
+                    <a:lnL w="12700" cap="flat" cmpd="sng" algn="ctr">
+                      <a:solidFill>
+                        <a:schemeClr val="tx1"/>
+                      </a:solidFill>
+                      <a:prstDash val="solid"/>
+                      <a:round/>
+                      <a:headEnd type="none" w="med" len="med"/>
+                      <a:tailEnd type="none" w="med" len="med"/>
+                    </a:lnL>
+                    <a:lnR w="12700" cap="flat" cmpd="sng" algn="ctr">
+                      <a:solidFill>
+                        <a:schemeClr val="tx1"/>
+                      </a:solidFill>
+                      <a:prstDash val="solid"/>
+                      <a:round/>
+                      <a:headEnd type="none" w="med" len="med"/>
+                      <a:tailEnd type="none" w="med" len="med"/>
+                    </a:lnR>
+                    <a:lnT w="12700" cap="flat" cmpd="sng" algn="ctr">
+                      <a:solidFill>
+                        <a:schemeClr val="tx1"/>
+                      </a:solidFill>
+                      <a:prstDash val="solid"/>
+                      <a:round/>
+                      <a:headEnd type="none" w="med" len="med"/>
+                      <a:tailEnd type="none" w="med" len="med"/>
+                    </a:lnT>
+                    <a:lnB w="12700" cap="flat" cmpd="sng" algn="ctr">
+                      <a:solidFill>
+                        <a:schemeClr val="tx1"/>
+                      </a:solidFill>
+                      <a:prstDash val="solid"/>
+                      <a:round/>
+                      <a:headEnd type="none" w="med" len="med"/>
+                      <a:tailEnd type="none" w="med" len="med"/>
+                    </a:lnB>
+                  </a:tcPr>
+                </a:tc>
+                <a:tc>
+                  <a:txBody>
+                    <a:bodyPr/>
+                    <a:lstStyle/>
+                    <a:p>
+                      <a:pPr algn="ctr"/>
+                      <a:r>
+                        <a:rPr lang="en-GB" dirty="0" err="1"/>
+                        <a:t>n.a.</a:t>
+                      </a:r>
+                      <a:endParaRPr lang="en-US" b="0" dirty="0"/>
+                    </a:p>
+                  </a:txBody>
+                  <a:tcPr>
+                    <a:lnL w="12700" cap="flat" cmpd="sng" algn="ctr">
+                      <a:solidFill>
+                        <a:schemeClr val="tx1"/>
+                      </a:solidFill>
+                      <a:prstDash val="solid"/>
+                      <a:round/>
+                      <a:headEnd type="none" w="med" len="med"/>
+                      <a:tailEnd type="none" w="med" len="med"/>
+                    </a:lnL>
+                    <a:lnR w="12700" cap="flat" cmpd="sng" algn="ctr">
+                      <a:solidFill>
+                        <a:schemeClr val="tx1"/>
+                      </a:solidFill>
+                      <a:prstDash val="solid"/>
+                      <a:round/>
+                      <a:headEnd type="none" w="med" len="med"/>
+                      <a:tailEnd type="none" w="med" len="med"/>
+                    </a:lnR>
+                    <a:lnT w="12700" cap="flat" cmpd="sng" algn="ctr">
+                      <a:solidFill>
+                        <a:schemeClr val="tx1"/>
+                      </a:solidFill>
+                      <a:prstDash val="solid"/>
+                      <a:round/>
+                      <a:headEnd type="none" w="med" len="med"/>
+                      <a:tailEnd type="none" w="med" len="med"/>
+                    </a:lnT>
+                    <a:lnB w="12700" cap="flat" cmpd="sng" algn="ctr">
+                      <a:solidFill>
+                        <a:schemeClr val="tx1"/>
+                      </a:solidFill>
+                      <a:prstDash val="solid"/>
+                      <a:round/>
+                      <a:headEnd type="none" w="med" len="med"/>
+                      <a:tailEnd type="none" w="med" len="med"/>
+                    </a:lnB>
+                  </a:tcPr>
+                </a:tc>
+                <a:extLst>
+                  <a:ext uri="{0D108BD9-81ED-4DB2-BD59-A6C34878D82A}">
+                    <a16:rowId xmlns:a16="http://schemas.microsoft.com/office/drawing/2014/main" val="2117265004"/>
+                  </a:ext>
+                </a:extLst>
+              </a:tr>
+            </a:tbl>
+          </a:graphicData>
+        </a:graphic>
+      </p:graphicFrame>
+      <p:grpSp>
+        <p:nvGrpSpPr>
+          <p:cNvPr id="22" name="Group 21">
+            <a:extLst>
+              <a:ext uri="{FF2B5EF4-FFF2-40B4-BE49-F238E27FC236}">
+                <a16:creationId xmlns:a16="http://schemas.microsoft.com/office/drawing/2014/main" id="{7BC04DAD-EF80-47AC-878D-FEA2BA3662FD}"/>
+              </a:ext>
+            </a:extLst>
+          </p:cNvPr>
+          <p:cNvGrpSpPr/>
+          <p:nvPr/>
+        </p:nvGrpSpPr>
+        <p:grpSpPr>
+          <a:xfrm>
+            <a:off x="7187765" y="679047"/>
+            <a:ext cx="5198382" cy="3980062"/>
+            <a:chOff x="7149252" y="918622"/>
+            <a:chExt cx="5198382" cy="3980062"/>
+          </a:xfrm>
+        </p:grpSpPr>
+        <p:pic>
+          <p:nvPicPr>
+            <p:cNvPr id="4" name="Picture 3">
+              <a:extLst>
+                <a:ext uri="{FF2B5EF4-FFF2-40B4-BE49-F238E27FC236}">
+                  <a16:creationId xmlns:a16="http://schemas.microsoft.com/office/drawing/2014/main" id="{A7983D3F-2907-4675-BEDA-FA5796EA749F}"/>
+                </a:ext>
+              </a:extLst>
+            </p:cNvPr>
+            <p:cNvPicPr>
+              <a:picLocks noChangeAspect="1"/>
+            </p:cNvPicPr>
+            <p:nvPr/>
+          </p:nvPicPr>
+          <p:blipFill>
+            <a:blip r:embed="rId12"/>
+            <a:stretch>
+              <a:fillRect/>
+            </a:stretch>
+          </p:blipFill>
+          <p:spPr>
+            <a:xfrm>
+              <a:off x="7814301" y="1409488"/>
+              <a:ext cx="4533333" cy="3457143"/>
+            </a:xfrm>
+            <a:prstGeom prst="rect">
+              <a:avLst/>
+            </a:prstGeom>
+          </p:spPr>
+        </p:pic>
+        <p:sp>
+          <p:nvSpPr>
+            <p:cNvPr id="16" name="TextBox 15">
+              <a:extLst>
+                <a:ext uri="{FF2B5EF4-FFF2-40B4-BE49-F238E27FC236}">
+                  <a16:creationId xmlns:a16="http://schemas.microsoft.com/office/drawing/2014/main" id="{EA1BA107-CFE2-44E3-A5E5-B6D573F8E254}"/>
+                </a:ext>
+              </a:extLst>
+            </p:cNvPr>
+            <p:cNvSpPr txBox="1"/>
+            <p:nvPr/>
+          </p:nvSpPr>
+          <p:spPr>
+            <a:xfrm>
+              <a:off x="8270944" y="918622"/>
+              <a:ext cx="1474121" cy="430887"/>
+            </a:xfrm>
+            <a:prstGeom prst="rect">
+              <a:avLst/>
+            </a:prstGeom>
+            <a:noFill/>
+          </p:spPr>
+          <p:txBody>
+            <a:bodyPr wrap="none" rtlCol="0">
+              <a:spAutoFit/>
+            </a:bodyPr>
+            <a:lstStyle/>
+            <a:p>
+              <a:r>
+                <a:rPr lang="en-GB" sz="2200" dirty="0"/>
+                <a:t>destination</a:t>
+              </a:r>
+              <a:endParaRPr lang="en-US" sz="2200" dirty="0"/>
+            </a:p>
+          </p:txBody>
+        </p:sp>
+        <p:sp>
+          <p:nvSpPr>
+            <p:cNvPr id="17" name="TextBox 16">
+              <a:extLst>
+                <a:ext uri="{FF2B5EF4-FFF2-40B4-BE49-F238E27FC236}">
+                  <a16:creationId xmlns:a16="http://schemas.microsoft.com/office/drawing/2014/main" id="{271F1498-A600-41F2-AC75-B62ED706C352}"/>
+                </a:ext>
+              </a:extLst>
+            </p:cNvPr>
+            <p:cNvSpPr txBox="1"/>
+            <p:nvPr/>
+          </p:nvSpPr>
+          <p:spPr>
+            <a:xfrm>
+              <a:off x="10819707" y="918622"/>
+              <a:ext cx="945195" cy="430887"/>
+            </a:xfrm>
+            <a:prstGeom prst="rect">
+              <a:avLst/>
+            </a:prstGeom>
+            <a:noFill/>
+          </p:spPr>
+          <p:txBody>
+            <a:bodyPr wrap="none" rtlCol="0">
+              <a:spAutoFit/>
+            </a:bodyPr>
+            <a:lstStyle/>
+            <a:p>
+              <a:r>
+                <a:rPr lang="en-GB" sz="2200" dirty="0"/>
+                <a:t>source</a:t>
+              </a:r>
+              <a:endParaRPr lang="en-US" sz="2200" dirty="0"/>
+            </a:p>
+          </p:txBody>
+        </p:sp>
+        <p:sp>
+          <p:nvSpPr>
+            <p:cNvPr id="18" name="TextBox 17">
+              <a:extLst>
+                <a:ext uri="{FF2B5EF4-FFF2-40B4-BE49-F238E27FC236}">
+                  <a16:creationId xmlns:a16="http://schemas.microsoft.com/office/drawing/2014/main" id="{B277AE56-F29F-4EDB-A472-230C9DE0A0E2}"/>
+                </a:ext>
+              </a:extLst>
+            </p:cNvPr>
+            <p:cNvSpPr txBox="1"/>
+            <p:nvPr/>
+          </p:nvSpPr>
+          <p:spPr>
+            <a:xfrm rot="16200000">
+              <a:off x="6263753" y="2190745"/>
+              <a:ext cx="2201885" cy="430887"/>
+            </a:xfrm>
+            <a:prstGeom prst="rect">
+              <a:avLst/>
+            </a:prstGeom>
+            <a:noFill/>
+          </p:spPr>
+          <p:txBody>
+            <a:bodyPr wrap="none" rtlCol="0">
+              <a:spAutoFit/>
+            </a:bodyPr>
+            <a:lstStyle/>
+            <a:p>
+              <a:r>
+                <a:rPr lang="en-GB" sz="2200" dirty="0"/>
+                <a:t>volumetric model</a:t>
+              </a:r>
+              <a:endParaRPr lang="en-US" sz="2200" dirty="0"/>
+            </a:p>
+          </p:txBody>
+        </p:sp>
+        <p:sp>
+          <p:nvSpPr>
+            <p:cNvPr id="19" name="TextBox 18">
+              <a:extLst>
+                <a:ext uri="{FF2B5EF4-FFF2-40B4-BE49-F238E27FC236}">
+                  <a16:creationId xmlns:a16="http://schemas.microsoft.com/office/drawing/2014/main" id="{1DBEC4E1-7841-4561-949A-4E39B4DA92A4}"/>
+                </a:ext>
+              </a:extLst>
+            </p:cNvPr>
+            <p:cNvSpPr txBox="1"/>
+            <p:nvPr/>
+          </p:nvSpPr>
+          <p:spPr>
+            <a:xfrm rot="16200000">
+              <a:off x="6821921" y="4043466"/>
+              <a:ext cx="1085554" cy="430887"/>
+            </a:xfrm>
+            <a:prstGeom prst="rect">
+              <a:avLst/>
+            </a:prstGeom>
+            <a:noFill/>
+          </p:spPr>
+          <p:txBody>
+            <a:bodyPr wrap="none" rtlCol="0">
+              <a:spAutoFit/>
+            </a:bodyPr>
+            <a:lstStyle/>
+            <a:p>
+              <a:r>
+                <a:rPr lang="en-GB" sz="2200" dirty="0"/>
+                <a:t>2D-slice</a:t>
+              </a:r>
+              <a:endParaRPr lang="en-US" sz="2200" dirty="0"/>
+            </a:p>
+          </p:txBody>
+        </p:sp>
+        <p:sp>
+          <p:nvSpPr>
+            <p:cNvPr id="20" name="Left Brace 19">
+              <a:extLst>
+                <a:ext uri="{FF2B5EF4-FFF2-40B4-BE49-F238E27FC236}">
+                  <a16:creationId xmlns:a16="http://schemas.microsoft.com/office/drawing/2014/main" id="{009CF599-B8F0-4309-99AB-6E3C39E848B5}"/>
+                </a:ext>
+              </a:extLst>
+            </p:cNvPr>
+            <p:cNvSpPr/>
+            <p:nvPr/>
+          </p:nvSpPr>
+          <p:spPr>
+            <a:xfrm>
+              <a:off x="7549361" y="3574874"/>
+              <a:ext cx="369333" cy="1323810"/>
+            </a:xfrm>
+            <a:prstGeom prst="leftBrace">
+              <a:avLst>
+                <a:gd name="adj1" fmla="val 33091"/>
+                <a:gd name="adj2" fmla="val 50000"/>
+              </a:avLst>
+            </a:prstGeom>
+          </p:spPr>
+          <p:style>
+            <a:lnRef idx="3">
+              <a:schemeClr val="dk1"/>
+            </a:lnRef>
+            <a:fillRef idx="0">
+              <a:schemeClr val="dk1"/>
+            </a:fillRef>
+            <a:effectRef idx="2">
+              <a:schemeClr val="dk1"/>
+            </a:effectRef>
+            <a:fontRef idx="minor">
+              <a:schemeClr val="tx1"/>
+            </a:fontRef>
+          </p:style>
+          <p:txBody>
+            <a:bodyPr rtlCol="0" anchor="ctr"/>
+            <a:lstStyle/>
+            <a:p>
+              <a:pPr algn="ctr"/>
+              <a:endParaRPr lang="en-US" sz="2200"/>
+            </a:p>
+          </p:txBody>
+        </p:sp>
+        <p:sp>
+          <p:nvSpPr>
+            <p:cNvPr id="21" name="Left Brace 20">
+              <a:extLst>
+                <a:ext uri="{FF2B5EF4-FFF2-40B4-BE49-F238E27FC236}">
+                  <a16:creationId xmlns:a16="http://schemas.microsoft.com/office/drawing/2014/main" id="{A244408F-065B-4BD3-81B0-6A83E0313278}"/>
+                </a:ext>
+              </a:extLst>
+            </p:cNvPr>
+            <p:cNvSpPr/>
+            <p:nvPr/>
+          </p:nvSpPr>
+          <p:spPr>
+            <a:xfrm>
+              <a:off x="7549361" y="1438360"/>
+              <a:ext cx="369333" cy="1921335"/>
+            </a:xfrm>
+            <a:prstGeom prst="leftBrace">
+              <a:avLst>
+                <a:gd name="adj1" fmla="val 45470"/>
+                <a:gd name="adj2" fmla="val 50000"/>
+              </a:avLst>
+            </a:prstGeom>
+          </p:spPr>
+          <p:style>
+            <a:lnRef idx="3">
+              <a:schemeClr val="dk1"/>
+            </a:lnRef>
+            <a:fillRef idx="0">
+              <a:schemeClr val="dk1"/>
+            </a:fillRef>
+            <a:effectRef idx="2">
+              <a:schemeClr val="dk1"/>
+            </a:effectRef>
+            <a:fontRef idx="minor">
+              <a:schemeClr val="tx1"/>
+            </a:fontRef>
+          </p:style>
+          <p:txBody>
+            <a:bodyPr rtlCol="0" anchor="ctr"/>
+            <a:lstStyle/>
+            <a:p>
+              <a:pPr algn="ctr"/>
+              <a:endParaRPr lang="en-US" sz="2200"/>
+            </a:p>
+          </p:txBody>
+        </p:sp>
+      </p:grpSp>
+      <p:sp>
+        <p:nvSpPr>
+          <p:cNvPr id="24" name="Left Brace 23">
+            <a:extLst>
+              <a:ext uri="{FF2B5EF4-FFF2-40B4-BE49-F238E27FC236}">
+                <a16:creationId xmlns:a16="http://schemas.microsoft.com/office/drawing/2014/main" id="{B32FD1AD-D205-4267-9F8A-AD2503CA93C0}"/>
+              </a:ext>
+            </a:extLst>
+          </p:cNvPr>
+          <p:cNvSpPr/>
+          <p:nvPr/>
+        </p:nvSpPr>
+        <p:spPr>
+          <a:xfrm rot="5400000">
+            <a:off x="9814410" y="-82045"/>
+            <a:ext cx="369333" cy="11087366"/>
+          </a:xfrm>
+          <a:prstGeom prst="leftBrace">
+            <a:avLst>
+              <a:gd name="adj1" fmla="val 45470"/>
+              <a:gd name="adj2" fmla="val 50000"/>
+            </a:avLst>
+          </a:prstGeom>
+        </p:spPr>
+        <p:style>
+          <a:lnRef idx="3">
+            <a:schemeClr val="dk1"/>
+          </a:lnRef>
+          <a:fillRef idx="0">
+            <a:schemeClr val="dk1"/>
+          </a:fillRef>
+          <a:effectRef idx="2">
+            <a:schemeClr val="dk1"/>
+          </a:effectRef>
+          <a:fontRef idx="minor">
+            <a:schemeClr val="tx1"/>
+          </a:fontRef>
+        </p:style>
+        <p:txBody>
+          <a:bodyPr rtlCol="0" anchor="ctr"/>
+          <a:lstStyle/>
+          <a:p>
+            <a:pPr algn="ctr"/>
+            <a:endParaRPr lang="en-US"/>
+          </a:p>
+        </p:txBody>
+      </p:sp>
+      <p:sp>
+        <p:nvSpPr>
+          <p:cNvPr id="26" name="TextBox 25">
+            <a:extLst>
+              <a:ext uri="{FF2B5EF4-FFF2-40B4-BE49-F238E27FC236}">
+                <a16:creationId xmlns:a16="http://schemas.microsoft.com/office/drawing/2014/main" id="{38EC1A6C-DB70-41E3-BD9B-791C180E9194}"/>
+              </a:ext>
+            </a:extLst>
+          </p:cNvPr>
+          <p:cNvSpPr txBox="1"/>
+          <p:nvPr/>
+        </p:nvSpPr>
+        <p:spPr>
+          <a:xfrm rot="16200000">
+            <a:off x="732808" y="7393609"/>
+            <a:ext cx="4109587" cy="430887"/>
+          </a:xfrm>
+          <a:prstGeom prst="rect">
+            <a:avLst/>
+          </a:prstGeom>
+          <a:noFill/>
+        </p:spPr>
+        <p:txBody>
+          <a:bodyPr wrap="none" rtlCol="0">
+            <a:spAutoFit/>
+          </a:bodyPr>
+          <a:lstStyle/>
+          <a:p>
+            <a:r>
+              <a:rPr lang="en-GB" sz="2200" dirty="0"/>
+              <a:t>destination channel after blending</a:t>
+            </a:r>
+            <a:endParaRPr lang="en-US" sz="2200" dirty="0"/>
+          </a:p>
+        </p:txBody>
+      </p:sp>
+      <p:sp>
+        <p:nvSpPr>
+          <p:cNvPr id="28" name="Left Brace 27">
+            <a:extLst>
+              <a:ext uri="{FF2B5EF4-FFF2-40B4-BE49-F238E27FC236}">
+                <a16:creationId xmlns:a16="http://schemas.microsoft.com/office/drawing/2014/main" id="{B3B0D0AB-04E0-410E-80B2-0CBC9A8DEC7B}"/>
+              </a:ext>
+            </a:extLst>
+          </p:cNvPr>
+          <p:cNvSpPr/>
+          <p:nvPr/>
+        </p:nvSpPr>
+        <p:spPr>
+          <a:xfrm>
+            <a:off x="3216808" y="5891737"/>
+            <a:ext cx="369333" cy="3487344"/>
+          </a:xfrm>
+          <a:prstGeom prst="leftBrace">
+            <a:avLst>
+              <a:gd name="adj1" fmla="val 33091"/>
+              <a:gd name="adj2" fmla="val 50000"/>
+            </a:avLst>
+          </a:prstGeom>
+        </p:spPr>
+        <p:style>
+          <a:lnRef idx="3">
+            <a:schemeClr val="dk1"/>
+          </a:lnRef>
+          <a:fillRef idx="0">
+            <a:schemeClr val="dk1"/>
+          </a:fillRef>
+          <a:effectRef idx="2">
+            <a:schemeClr val="dk1"/>
+          </a:effectRef>
+          <a:fontRef idx="minor">
+            <a:schemeClr val="tx1"/>
+          </a:fontRef>
+        </p:style>
+        <p:txBody>
+          <a:bodyPr rtlCol="0" anchor="ctr"/>
+          <a:lstStyle/>
+          <a:p>
+            <a:pPr algn="ctr"/>
+            <a:endParaRPr lang="en-US"/>
+          </a:p>
+        </p:txBody>
+      </p:sp>
+    </p:spTree>
+    <p:extLst>
+      <p:ext uri="{BB962C8B-B14F-4D97-AF65-F5344CB8AC3E}">
+        <p14:creationId xmlns:p14="http://schemas.microsoft.com/office/powerpoint/2010/main" val="2493973"/>
+      </p:ext>
+    </p:extLst>
+  </p:cSld>
+  <p:clrMapOvr>
+    <a:masterClrMapping/>
+  </p:clrMapOvr>
+</p:sld>
+</file>
+
 <file path=ppt/theme/theme1.xml><?xml version="1.0" encoding="utf-8"?>
 <a:theme xmlns:a="http://schemas.openxmlformats.org/drawingml/2006/main" name="Office Theme">
   <a:themeElements>

</xml_diff>

<commit_message>
Fix old terms in examples
</commit_message>
<xml_diff>
--- a/Presentation/Resources for v07.pptx
+++ b/Presentation/Resources for v07.pptx
@@ -43363,7 +43363,7 @@
         </p:nvGrpSpPr>
         <p:grpSpPr>
           <a:xfrm>
-            <a:off x="-5427630" y="-870523"/>
+            <a:off x="-3188441" y="-491495"/>
             <a:ext cx="10855260" cy="8310011"/>
             <a:chOff x="-5427630" y="-870523"/>
             <a:chExt cx="10855260" cy="8310011"/>
@@ -45662,8 +45662,8 @@
           </p:nvSpPr>
           <p:spPr>
             <a:xfrm>
-              <a:off x="1938681" y="3903388"/>
-              <a:ext cx="2037866" cy="369332"/>
+              <a:off x="1733410" y="3903388"/>
+              <a:ext cx="3061094" cy="523220"/>
             </a:xfrm>
             <a:prstGeom prst="rect">
               <a:avLst/>
@@ -45677,10 +45677,10 @@
             <a:lstStyle/>
             <a:p>
               <a:r>
-                <a:rPr lang="en-GB" dirty="0"/>
+                <a:rPr lang="en-GB" sz="2800" dirty="0"/>
                 <a:t>destination channel</a:t>
               </a:r>
-              <a:endParaRPr lang="en-US" dirty="0"/>
+              <a:endParaRPr lang="en-US" sz="2800" dirty="0"/>
             </a:p>
           </p:txBody>
         </p:sp>
@@ -45699,10 +45699,10 @@
         </p:nvGrpSpPr>
         <p:grpSpPr>
           <a:xfrm>
-            <a:off x="-5758077" y="7488842"/>
-            <a:ext cx="10855260" cy="8310011"/>
+            <a:off x="-3670074" y="8350989"/>
+            <a:ext cx="11559948" cy="8310011"/>
             <a:chOff x="-5758077" y="9213975"/>
-            <a:chExt cx="10855260" cy="8310011"/>
+            <a:chExt cx="11559948" cy="8310011"/>
           </a:xfrm>
         </p:grpSpPr>
         <p:grpSp>
@@ -48066,8 +48066,8 @@
           </p:nvSpPr>
           <p:spPr>
             <a:xfrm>
-              <a:off x="1247621" y="14126094"/>
-              <a:ext cx="3742499" cy="369332"/>
+              <a:off x="613143" y="14126094"/>
+              <a:ext cx="5188728" cy="523220"/>
             </a:xfrm>
             <a:prstGeom prst="rect">
               <a:avLst/>
@@ -48081,10 +48081,10 @@
             <a:lstStyle/>
             <a:p>
               <a:r>
-                <a:rPr lang="en-GB" dirty="0"/>
-                <a:t>destination channel after compositing</a:t>
+                <a:rPr lang="en-GB" sz="2800" dirty="0"/>
+                <a:t>destination channel after blending</a:t>
               </a:r>
-              <a:endParaRPr lang="en-US" dirty="0"/>
+              <a:endParaRPr lang="en-US" sz="2800" dirty="0"/>
             </a:p>
           </p:txBody>
         </p:sp>
@@ -48103,10 +48103,10 @@
         </p:nvGrpSpPr>
         <p:grpSpPr>
           <a:xfrm>
-            <a:off x="1459623" y="4439057"/>
-            <a:ext cx="8137721" cy="4041042"/>
-            <a:chOff x="1268984" y="5325771"/>
-            <a:chExt cx="8137721" cy="4041042"/>
+            <a:off x="750494" y="5170577"/>
+            <a:ext cx="9861250" cy="4106246"/>
+            <a:chOff x="559855" y="5325771"/>
+            <a:chExt cx="9861250" cy="4106246"/>
           </a:xfrm>
         </p:grpSpPr>
         <p:pic>
@@ -52264,8 +52264,8 @@
           </p:nvSpPr>
           <p:spPr>
             <a:xfrm>
-              <a:off x="5727220" y="8908797"/>
-              <a:ext cx="3256661" cy="369332"/>
+              <a:off x="5465966" y="8908797"/>
+              <a:ext cx="4955139" cy="523220"/>
             </a:xfrm>
             <a:prstGeom prst="rect">
               <a:avLst/>
@@ -52279,10 +52279,10 @@
             <a:lstStyle/>
             <a:p>
               <a:r>
-                <a:rPr lang="en-GB" dirty="0"/>
+                <a:rPr lang="en-GB" sz="2800" dirty="0"/>
                 <a:t>maskingimage3dchannelselector</a:t>
               </a:r>
-              <a:endParaRPr lang="en-US" dirty="0"/>
+              <a:endParaRPr lang="en-US" sz="2800" dirty="0"/>
             </a:p>
           </p:txBody>
         </p:sp>
@@ -52300,8 +52300,8 @@
           </p:nvSpPr>
           <p:spPr>
             <a:xfrm>
-              <a:off x="1268984" y="8997481"/>
-              <a:ext cx="3107389" cy="369332"/>
+              <a:off x="559855" y="8904176"/>
+              <a:ext cx="4722255" cy="523220"/>
             </a:xfrm>
             <a:prstGeom prst="rect">
               <a:avLst/>
@@ -52314,10 +52314,10 @@
             <a:lstStyle/>
             <a:p>
               <a:r>
-                <a:rPr lang="en-GB" dirty="0"/>
+                <a:rPr lang="en-GB" sz="2800" dirty="0"/>
                 <a:t>sourceimage3dchannelselector</a:t>
               </a:r>
-              <a:endParaRPr lang="en-US" dirty="0"/>
+              <a:endParaRPr lang="en-US" sz="2800" dirty="0"/>
             </a:p>
           </p:txBody>
         </p:sp>

</xml_diff>